<commit_message>
Begin updating for LWG (D3091R5). Added test for `span` example. Update presentation for new status quo (no `ref_or`)
</commit_message>
<xml_diff>
--- a/P3091-map_lookup/P3091 Better lookups for map and unordered_map.pptx
+++ b/P3091-map_lookup/P3091 Better lookups for map and unordered_map.pptx
@@ -1176,7 +1176,7 @@
           <a:p>
             <a:fld id="{CEFB5EEE-3E28-483D-83CF-7CFBAD280CA5}" type="datetimeFigureOut">
               <a:rPr lang="en-US" smtClean="0"/>
-              <a:t>6/20/2025</a:t>
+              <a:t>6/22/2025</a:t>
             </a:fld>
             <a:endParaRPr lang="en-US"/>
           </a:p>
@@ -1943,7 +1943,7 @@
           <a:p>
             <a:fld id="{02C5BE3E-DC87-4987-AF70-1F906EC5439D}" type="datetime1">
               <a:rPr lang="en-US" smtClean="0"/>
-              <a:t>6/20/2025</a:t>
+              <a:t>6/22/2025</a:t>
             </a:fld>
             <a:endParaRPr lang="en-US"/>
           </a:p>
@@ -2236,7 +2236,7 @@
           <a:p>
             <a:fld id="{23D892F7-AA30-4A4C-B959-E3F3A9EC8524}" type="datetime1">
               <a:rPr lang="en-US" smtClean="0"/>
-              <a:t>6/20/2025</a:t>
+              <a:t>6/22/2025</a:t>
             </a:fld>
             <a:endParaRPr lang="en-US"/>
           </a:p>
@@ -2482,7 +2482,7 @@
           <a:p>
             <a:fld id="{272C4D85-EDE8-4C6C-815F-2FEBAB7C380E}" type="datetime1">
               <a:rPr lang="en-US" smtClean="0"/>
-              <a:t>6/20/2025</a:t>
+              <a:t>6/22/2025</a:t>
             </a:fld>
             <a:endParaRPr lang="en-US"/>
           </a:p>
@@ -3020,7 +3020,7 @@
           <a:p>
             <a:fld id="{4F67D4DA-9BCF-452F-B904-BB8D0316B67C}" type="datetime1">
               <a:rPr lang="en-US" smtClean="0"/>
-              <a:t>6/20/2025</a:t>
+              <a:t>6/22/2025</a:t>
             </a:fld>
             <a:endParaRPr lang="en-US"/>
           </a:p>
@@ -3266,7 +3266,7 @@
           <a:p>
             <a:fld id="{E2226ABC-75D3-4A22-ADAE-704E445553F8}" type="datetime1">
               <a:rPr lang="en-US" smtClean="0"/>
-              <a:t>6/20/2025</a:t>
+              <a:t>6/22/2025</a:t>
             </a:fld>
             <a:endParaRPr lang="en-US"/>
           </a:p>
@@ -3796,7 +3796,7 @@
           <a:p>
             <a:fld id="{B3EB47DD-4F4F-4521-809A-910C6446A8E9}" type="datetime1">
               <a:rPr lang="en-US" smtClean="0"/>
-              <a:t>6/20/2025</a:t>
+              <a:t>6/22/2025</a:t>
             </a:fld>
             <a:endParaRPr lang="en-US"/>
           </a:p>
@@ -4091,7 +4091,7 @@
           <a:p>
             <a:fld id="{D5C1893C-E788-48A8-9A18-B793B108C2CE}" type="datetime1">
               <a:rPr lang="en-US" smtClean="0"/>
-              <a:t>6/20/2025</a:t>
+              <a:t>6/22/2025</a:t>
             </a:fld>
             <a:endParaRPr lang="en-US"/>
           </a:p>
@@ -4262,7 +4262,7 @@
           <a:p>
             <a:fld id="{89F61247-4C9D-47C0-9657-80C96CCB02A1}" type="datetime1">
               <a:rPr lang="en-US" smtClean="0"/>
-              <a:t>6/20/2025</a:t>
+              <a:t>6/22/2025</a:t>
             </a:fld>
             <a:endParaRPr lang="en-US"/>
           </a:p>
@@ -4439,7 +4439,7 @@
           <a:p>
             <a:fld id="{2BB2F593-965F-47F8-9F01-94BF3B3362FD}" type="datetime1">
               <a:rPr lang="en-US" smtClean="0"/>
-              <a:t>6/20/2025</a:t>
+              <a:t>6/22/2025</a:t>
             </a:fld>
             <a:endParaRPr lang="en-US"/>
           </a:p>
@@ -4621,7 +4621,7 @@
           <a:p>
             <a:fld id="{D1A98742-6638-43AC-A30F-B0F4E802E4B2}" type="datetime1">
               <a:rPr lang="en-US" smtClean="0"/>
-              <a:t>6/20/2025</a:t>
+              <a:t>6/22/2025</a:t>
             </a:fld>
             <a:endParaRPr lang="en-US"/>
           </a:p>
@@ -4875,7 +4875,7 @@
           <a:p>
             <a:fld id="{E04F68CC-AE29-43DC-8C36-74D991BDD660}" type="datetime1">
               <a:rPr lang="en-US" smtClean="0"/>
-              <a:t>6/20/2025</a:t>
+              <a:t>6/22/2025</a:t>
             </a:fld>
             <a:endParaRPr lang="en-US"/>
           </a:p>
@@ -5173,7 +5173,7 @@
           <a:p>
             <a:fld id="{06ABA9E8-E98F-4A61-AF76-7349863B9923}" type="datetime1">
               <a:rPr lang="en-US" smtClean="0"/>
-              <a:t>6/20/2025</a:t>
+              <a:t>6/22/2025</a:t>
             </a:fld>
             <a:endParaRPr lang="en-US"/>
           </a:p>
@@ -5631,7 +5631,7 @@
           <a:p>
             <a:fld id="{508BABE2-3DC8-4D39-B4AF-CCF82C82E0F0}" type="datetime1">
               <a:rPr lang="en-US" smtClean="0"/>
-              <a:t>6/20/2025</a:t>
+              <a:t>6/22/2025</a:t>
             </a:fld>
             <a:endParaRPr lang="en-US"/>
           </a:p>
@@ -5767,7 +5767,7 @@
           <a:p>
             <a:fld id="{64601F53-FE17-4660-BE69-DE27478D4CCC}" type="datetime1">
               <a:rPr lang="en-US" smtClean="0"/>
-              <a:t>6/20/2025</a:t>
+              <a:t>6/22/2025</a:t>
             </a:fld>
             <a:endParaRPr lang="en-US"/>
           </a:p>
@@ -5876,7 +5876,7 @@
           <a:p>
             <a:fld id="{DDF66756-33DB-4322-A7AB-33F3A7E33A2D}" type="datetime1">
               <a:rPr lang="en-US" smtClean="0"/>
-              <a:t>6/20/2025</a:t>
+              <a:t>6/22/2025</a:t>
             </a:fld>
             <a:endParaRPr lang="en-US"/>
           </a:p>
@@ -6166,7 +6166,7 @@
           <a:p>
             <a:fld id="{E9CE1D7A-DAAA-4183-B469-EDEECE92431D}" type="datetime1">
               <a:rPr lang="en-US" smtClean="0"/>
-              <a:t>6/20/2025</a:t>
+              <a:t>6/22/2025</a:t>
             </a:fld>
             <a:endParaRPr lang="en-US"/>
           </a:p>
@@ -6454,7 +6454,7 @@
           <a:p>
             <a:fld id="{E393BBCA-9B99-451E-A2F9-AA382E63F3EB}" type="datetime1">
               <a:rPr lang="en-US" smtClean="0"/>
-              <a:t>6/20/2025</a:t>
+              <a:t>6/22/2025</a:t>
             </a:fld>
             <a:endParaRPr lang="en-US"/>
           </a:p>
@@ -6981,7 +6981,7 @@
           <a:p>
             <a:fld id="{D6E2F156-B823-4FCD-8500-2C801BEF89A0}" type="datetime1">
               <a:rPr lang="en-US" smtClean="0"/>
-              <a:t>6/20/2025</a:t>
+              <a:t>6/22/2025</a:t>
             </a:fld>
             <a:endParaRPr lang="en-US"/>
           </a:p>
@@ -7605,15 +7605,7 @@
           <a:p>
             <a:r>
               <a:rPr lang="en-US" dirty="0"/>
-              <a:t>Pablo Halpern, LEWG</a:t>
-            </a:r>
-            <a:r>
-              <a:rPr lang="en-US"/>
-              <a:t>, June 20, </a:t>
-            </a:r>
-            <a:r>
-              <a:rPr lang="en-US" dirty="0"/>
-              <a:t>2024</a:t>
+              <a:t>Pablo Halpern, LEWG, June 20, 2024</a:t>
             </a:r>
             <a:endParaRPr lang="en-US" dirty="0">
               <a:hlinkClick r:id="rId2"/>
@@ -7911,7 +7903,7 @@
           <a:p>
             <a:fld id="{D1A98742-6638-43AC-A30F-B0F4E802E4B2}" type="datetime1">
               <a:rPr lang="en-US" smtClean="0"/>
-              <a:t>6/20/2025</a:t>
+              <a:t>6/22/2025</a:t>
             </a:fld>
             <a:endParaRPr lang="en-US"/>
           </a:p>
@@ -8655,7 +8647,7 @@
           <a:p>
             <a:fld id="{D1A98742-6638-43AC-A30F-B0F4E802E4B2}" type="datetime1">
               <a:rPr lang="en-US" smtClean="0"/>
-              <a:t>6/20/2025</a:t>
+              <a:t>6/22/2025</a:t>
             </a:fld>
             <a:endParaRPr lang="en-US"/>
           </a:p>
@@ -8861,7 +8853,7 @@
           <a:p>
             <a:fld id="{D1A98742-6638-43AC-A30F-B0F4E802E4B2}" type="datetime1">
               <a:rPr lang="en-US" smtClean="0"/>
-              <a:t>6/20/2025</a:t>
+              <a:t>6/22/2025</a:t>
             </a:fld>
             <a:endParaRPr lang="en-US"/>
           </a:p>
@@ -9153,7 +9145,7 @@
           <a:p>
             <a:fld id="{D1A98742-6638-43AC-A30F-B0F4E802E4B2}" type="datetime1">
               <a:rPr lang="en-US" smtClean="0"/>
-              <a:t>6/20/2025</a:t>
+              <a:t>6/22/2025</a:t>
             </a:fld>
             <a:endParaRPr lang="en-US"/>
           </a:p>
@@ -10575,7 +10567,7 @@
           <a:p>
             <a:fld id="{D1A98742-6638-43AC-A30F-B0F4E802E4B2}" type="datetime1">
               <a:rPr lang="en-US" smtClean="0"/>
-              <a:t>6/20/2025</a:t>
+              <a:t>6/22/2025</a:t>
             </a:fld>
             <a:endParaRPr lang="en-US"/>
           </a:p>
@@ -11866,7 +11858,7 @@
           <a:p>
             <a:fld id="{D1A98742-6638-43AC-A30F-B0F4E802E4B2}" type="datetime1">
               <a:rPr lang="en-US" smtClean="0"/>
-              <a:t>6/20/2025</a:t>
+              <a:t>6/22/2025</a:t>
             </a:fld>
             <a:endParaRPr lang="en-US"/>
           </a:p>
@@ -13866,7 +13858,7 @@
           <a:p>
             <a:fld id="{D1A98742-6638-43AC-A30F-B0F4E802E4B2}" type="datetime1">
               <a:rPr lang="en-US" smtClean="0"/>
-              <a:t>6/20/2025</a:t>
+              <a:t>6/22/2025</a:t>
             </a:fld>
             <a:endParaRPr lang="en-US"/>
           </a:p>
@@ -14066,25 +14058,7 @@
                 </a:solidFill>
                 <a:latin typeface="Consolas" panose="020B0609020204030204" pitchFamily="49" charset="0"/>
               </a:rPr>
-              <a:t>).</a:t>
-            </a:r>
-            <a:r>
-              <a:rPr lang="en-US" dirty="0" err="1">
-                <a:solidFill>
-                  <a:srgbClr val="FFFF00"/>
-                </a:solidFill>
-                <a:latin typeface="Consolas" panose="020B0609020204030204" pitchFamily="49" charset="0"/>
-              </a:rPr>
-              <a:t>value_or</a:t>
-            </a:r>
-            <a:r>
-              <a:rPr lang="en-US" dirty="0">
-                <a:solidFill>
-                  <a:srgbClr val="FFFF00"/>
-                </a:solidFill>
-                <a:latin typeface="Consolas" panose="020B0609020204030204" pitchFamily="49" charset="0"/>
-              </a:rPr>
-              <a:t>(-inf)</a:t>
+              <a:t>, -inf)</a:t>
             </a:r>
             <a:r>
               <a:rPr lang="en-US" dirty="0">
@@ -14826,35 +14800,35 @@
           </a:bodyPr>
           <a:lstStyle/>
           <a:p>
-            <a:endParaRPr lang="en-US"/>
-          </a:p>
-          <a:p>
-            <a:endParaRPr lang="en-US"/>
-          </a:p>
-          <a:p>
-            <a:endParaRPr lang="en-US"/>
-          </a:p>
-          <a:p>
-            <a:endParaRPr lang="en-US"/>
-          </a:p>
-          <a:p>
-            <a:r>
-              <a:rPr lang="en-US"/>
+            <a:endParaRPr lang="en-US" dirty="0"/>
+          </a:p>
+          <a:p>
+            <a:endParaRPr lang="en-US" dirty="0"/>
+          </a:p>
+          <a:p>
+            <a:endParaRPr lang="en-US" dirty="0"/>
+          </a:p>
+          <a:p>
+            <a:endParaRPr lang="en-US" dirty="0"/>
+          </a:p>
+          <a:p>
+            <a:r>
+              <a:rPr lang="en-US" dirty="0"/>
               <a:t>Value of </a:t>
             </a:r>
             <a:r>
-              <a:rPr lang="en-US">
+              <a:rPr lang="en-US" dirty="0">
                 <a:latin typeface="Courier New" panose="02070309020205020404" pitchFamily="49" charset="0"/>
                 <a:cs typeface="Courier New" panose="02070309020205020404" pitchFamily="49" charset="0"/>
               </a:rPr>
               <a:t>largest</a:t>
             </a:r>
             <a:r>
-              <a:rPr lang="en-US"/>
+              <a:rPr lang="en-US" dirty="0"/>
               <a:t> at end = </a:t>
             </a:r>
             <a:r>
-              <a:rPr lang="en-US" b="1">
+              <a:rPr lang="en-US" b="1" dirty="0">
                 <a:solidFill>
                   <a:srgbClr val="C00000"/>
                 </a:solidFill>
@@ -14863,29 +14837,29 @@
               </a:rPr>
               <a:t>-20.0</a:t>
             </a:r>
-            <a:endParaRPr lang="en-US" b="1">
+            <a:endParaRPr lang="en-US" b="1" dirty="0">
               <a:latin typeface="Courier New" panose="02070309020205020404" pitchFamily="49" charset="0"/>
               <a:cs typeface="Courier New" panose="02070309020205020404" pitchFamily="49" charset="0"/>
             </a:endParaRPr>
           </a:p>
           <a:p>
             <a:r>
-              <a:rPr lang="en-US"/>
+              <a:rPr lang="en-US" dirty="0"/>
               <a:t>Value of </a:t>
             </a:r>
             <a:r>
-              <a:rPr lang="en-US" err="1">
+              <a:rPr lang="en-US" dirty="0" err="1">
                 <a:latin typeface="Courier New" panose="02070309020205020404" pitchFamily="49" charset="0"/>
                 <a:cs typeface="Courier New" panose="02070309020205020404" pitchFamily="49" charset="0"/>
               </a:rPr>
               <a:t>theMap</a:t>
             </a:r>
             <a:r>
-              <a:rPr lang="en-US"/>
+              <a:rPr lang="en-US" dirty="0"/>
               <a:t> at end = </a:t>
             </a:r>
             <a:r>
-              <a:rPr lang="en-US" b="1">
+              <a:rPr lang="en-US" b="1" dirty="0">
                 <a:solidFill>
                   <a:srgbClr val="C00000"/>
                 </a:solidFill>
@@ -14895,7 +14869,7 @@
               <a:t>{</a:t>
             </a:r>
             <a:r>
-              <a:rPr lang="en-US" b="1">
+              <a:rPr lang="en-US" b="1" dirty="0">
                 <a:solidFill>
                   <a:srgbClr val="00B0F0"/>
                 </a:solidFill>
@@ -14905,7 +14879,7 @@
               <a:t>{3,-20}, {90,-90}, {110,4}</a:t>
             </a:r>
             <a:r>
-              <a:rPr lang="en-US" b="1">
+              <a:rPr lang="en-US" b="1" dirty="0">
                 <a:solidFill>
                   <a:srgbClr val="C00000"/>
                 </a:solidFill>
@@ -14917,38 +14891,38 @@
           </a:p>
           <a:p>
             <a:r>
-              <a:rPr lang="en-US">
+              <a:rPr lang="en-US" dirty="0">
                 <a:cs typeface="Courier New" panose="02070309020205020404" pitchFamily="49" charset="0"/>
               </a:rPr>
               <a:t>If </a:t>
             </a:r>
             <a:r>
-              <a:rPr lang="en-US" err="1">
+              <a:rPr lang="en-US" dirty="0" err="1">
                 <a:cs typeface="Courier New" panose="02070309020205020404" pitchFamily="49" charset="0"/>
               </a:rPr>
               <a:t>theMap</a:t>
             </a:r>
             <a:r>
-              <a:rPr lang="en-US">
+              <a:rPr lang="en-US" dirty="0">
                 <a:cs typeface="Courier New" panose="02070309020205020404" pitchFamily="49" charset="0"/>
               </a:rPr>
               <a:t> is declared </a:t>
             </a:r>
             <a:r>
-              <a:rPr lang="en-US">
+              <a:rPr lang="en-US" dirty="0">
                 <a:latin typeface="Courier New" panose="02070309020205020404" pitchFamily="49" charset="0"/>
                 <a:cs typeface="Courier New" panose="02070309020205020404" pitchFamily="49" charset="0"/>
               </a:rPr>
               <a:t>const</a:t>
             </a:r>
             <a:r>
-              <a:rPr lang="en-US">
+              <a:rPr lang="en-US" dirty="0">
                 <a:cs typeface="Courier New" panose="02070309020205020404" pitchFamily="49" charset="0"/>
               </a:rPr>
               <a:t>: </a:t>
             </a:r>
             <a:r>
-              <a:rPr lang="en-US" b="1">
+              <a:rPr lang="en-US" b="1" dirty="0">
                 <a:solidFill>
                   <a:srgbClr val="C00000"/>
                 </a:solidFill>
@@ -14956,13 +14930,13 @@
               </a:rPr>
               <a:t>No problem</a:t>
             </a:r>
-            <a:endParaRPr lang="en-US">
+            <a:endParaRPr lang="en-US" dirty="0">
               <a:cs typeface="Courier New" panose="02070309020205020404" pitchFamily="49" charset="0"/>
             </a:endParaRPr>
           </a:p>
           <a:p>
             <a:r>
-              <a:rPr lang="en-US">
+              <a:rPr lang="en-US" dirty="0">
                 <a:cs typeface="Courier New" panose="02070309020205020404" pitchFamily="49" charset="0"/>
               </a:rPr>
               <a:t>Efficient?</a:t>
@@ -14970,7 +14944,7 @@
           </a:p>
           <a:p>
             <a:r>
-              <a:rPr lang="en-US">
+              <a:rPr lang="en-US" dirty="0">
                 <a:cs typeface="Courier New" panose="02070309020205020404" pitchFamily="49" charset="0"/>
               </a:rPr>
               <a:t>Concise &amp; Elegant?</a:t>
@@ -15001,7 +14975,7 @@
           <a:p>
             <a:fld id="{D1A98742-6638-43AC-A30F-B0F4E802E4B2}" type="datetime1">
               <a:rPr lang="en-US" smtClean="0"/>
-              <a:t>6/20/2025</a:t>
+              <a:t>6/22/2025</a:t>
             </a:fld>
             <a:endParaRPr lang="en-US"/>
           </a:p>
@@ -16437,7 +16411,7 @@
           <a:p>
             <a:fld id="{D1A98742-6638-43AC-A30F-B0F4E802E4B2}" type="datetime1">
               <a:rPr lang="en-US" smtClean="0"/>
-              <a:t>6/20/2025</a:t>
+              <a:t>6/22/2025</a:t>
             </a:fld>
             <a:endParaRPr lang="en-US"/>
           </a:p>
@@ -16553,8 +16527,8 @@
           <a:lstStyle/>
           <a:p>
             <a:r>
-              <a:rPr lang="en-US"/>
-              <a:t>Use in initializing a variable</a:t>
+              <a:rPr lang="en-US" dirty="0"/>
+              <a:t>Use-case: Initializing a Variable</a:t>
             </a:r>
           </a:p>
         </p:txBody>
@@ -16790,7 +16764,7 @@
                 </a:solidFill>
                 <a:latin typeface="Consolas" panose="020B0609020204030204" pitchFamily="49" charset="0"/>
               </a:rPr>
-              <a:t>std::map&lt;K, std::vector&lt;U&gt;&gt; m{ ... };</a:t>
+              <a:t>map&lt;K, std::vector&lt;U&gt;&gt; m{ ... };</a:t>
             </a:r>
             <a:br>
               <a:rPr lang="en-US" dirty="0">
@@ -16813,7 +16787,7 @@
                 </a:solidFill>
                 <a:latin typeface="Consolas" panose="020B0609020204030204" pitchFamily="49" charset="0"/>
               </a:rPr>
-              <a:t>std::array&lt;U, N&gt; preset{ ... };</a:t>
+              <a:t>array&lt;U, N&gt; preset{ ... };</a:t>
             </a:r>
             <a:br>
               <a:rPr lang="en-US" dirty="0">
@@ -16830,25 +16804,7 @@
                 </a:solidFill>
                 <a:latin typeface="Consolas" panose="020B0609020204030204" pitchFamily="49" charset="0"/>
               </a:rPr>
-              <a:t>auto </a:t>
-            </a:r>
-            <a:r>
-              <a:rPr lang="en-US" dirty="0" err="1">
-                <a:solidFill>
-                  <a:srgbClr val="0070C0"/>
-                </a:solidFill>
-                <a:latin typeface="Consolas" panose="020B0609020204030204" pitchFamily="49" charset="0"/>
-              </a:rPr>
-              <a:t>iter</a:t>
-            </a:r>
-            <a:r>
-              <a:rPr lang="en-US" dirty="0">
-                <a:solidFill>
-                  <a:srgbClr val="0070C0"/>
-                </a:solidFill>
-                <a:latin typeface="Consolas" panose="020B0609020204030204" pitchFamily="49" charset="0"/>
-              </a:rPr>
-              <a:t> = </a:t>
+              <a:t>auto iter = </a:t>
             </a:r>
             <a:r>
               <a:rPr lang="en-US" dirty="0" err="1">
@@ -16883,25 +16839,7 @@
                 </a:solidFill>
                 <a:latin typeface="Consolas" panose="020B0609020204030204" pitchFamily="49" charset="0"/>
               </a:rPr>
-              <a:t>std::span&lt;U&gt; x = </a:t>
-            </a:r>
-            <a:r>
-              <a:rPr lang="en-US" dirty="0" err="1">
-                <a:solidFill>
-                  <a:srgbClr val="0070C0"/>
-                </a:solidFill>
-                <a:latin typeface="Consolas" panose="020B0609020204030204" pitchFamily="49" charset="0"/>
-              </a:rPr>
-              <a:t>iter</a:t>
-            </a:r>
-            <a:r>
-              <a:rPr lang="en-US" dirty="0">
-                <a:solidFill>
-                  <a:srgbClr val="0070C0"/>
-                </a:solidFill>
-                <a:latin typeface="Consolas" panose="020B0609020204030204" pitchFamily="49" charset="0"/>
-              </a:rPr>
-              <a:t> == </a:t>
+              <a:t>auto x = iter == </a:t>
             </a:r>
             <a:r>
               <a:rPr lang="en-US" dirty="0" err="1">
@@ -16936,7 +16874,7 @@
                 </a:solidFill>
                 <a:latin typeface="Consolas" panose="020B0609020204030204" pitchFamily="49" charset="0"/>
               </a:rPr>
-              <a:t>    std::span&lt;U&gt;{preset} :</a:t>
+              <a:t>    span&lt;U&gt;{preset} : </a:t>
             </a:r>
             <a:br>
               <a:rPr lang="en-US" dirty="0">
@@ -16953,25 +16891,7 @@
                 </a:solidFill>
                 <a:latin typeface="Consolas" panose="020B0609020204030204" pitchFamily="49" charset="0"/>
               </a:rPr>
-              <a:t>    </a:t>
-            </a:r>
-            <a:r>
-              <a:rPr lang="en-US" dirty="0" err="1">
-                <a:solidFill>
-                  <a:srgbClr val="0070C0"/>
-                </a:solidFill>
-                <a:latin typeface="Consolas" panose="020B0609020204030204" pitchFamily="49" charset="0"/>
-              </a:rPr>
-              <a:t>iter</a:t>
-            </a:r>
-            <a:r>
-              <a:rPr lang="en-US" dirty="0">
-                <a:solidFill>
-                  <a:srgbClr val="0070C0"/>
-                </a:solidFill>
-                <a:latin typeface="Consolas" panose="020B0609020204030204" pitchFamily="49" charset="0"/>
-              </a:rPr>
-              <a:t>-&gt;second;</a:t>
+              <a:t>    span&lt;U&gt;{iter-&gt;second};</a:t>
             </a:r>
           </a:p>
         </p:txBody>
@@ -17141,7 +17061,7 @@
                 </a:solidFill>
                 <a:latin typeface="Consolas" panose="020B0609020204030204" pitchFamily="49" charset="0"/>
               </a:rPr>
-              <a:t>std::map&lt;K, std::vector&lt;U&gt;&gt; m{ ... };</a:t>
+              <a:t>map&lt;K, std::vector&lt;U&gt;&gt; m{ ... };</a:t>
             </a:r>
             <a:br>
               <a:rPr lang="en-US" dirty="0">
@@ -17164,7 +17084,7 @@
                 </a:solidFill>
                 <a:latin typeface="Consolas" panose="020B0609020204030204" pitchFamily="49" charset="0"/>
               </a:rPr>
-              <a:t>std::array&lt;U, N&gt; preset{ ... };</a:t>
+              <a:t>array&lt;U, N&gt; preset{ ... };</a:t>
             </a:r>
             <a:br>
               <a:rPr lang="en-US" dirty="0">
@@ -17181,7 +17101,7 @@
                 </a:solidFill>
                 <a:latin typeface="Consolas" panose="020B0609020204030204" pitchFamily="49" charset="0"/>
               </a:rPr>
-              <a:t>auto </a:t>
+              <a:t>auto x = optional&lt;span&lt;U&gt;&gt;(</a:t>
             </a:r>
             <a:r>
               <a:rPr lang="en-US" dirty="0" err="1">
@@ -17190,7 +17110,7 @@
                 </a:solidFill>
                 <a:latin typeface="Consolas" panose="020B0609020204030204" pitchFamily="49" charset="0"/>
               </a:rPr>
-              <a:t>elem</a:t>
+              <a:t>m.get</a:t>
             </a:r>
             <a:r>
               <a:rPr lang="en-US" dirty="0">
@@ -17199,25 +17119,7 @@
                 </a:solidFill>
                 <a:latin typeface="Consolas" panose="020B0609020204030204" pitchFamily="49" charset="0"/>
               </a:rPr>
-              <a:t> = </a:t>
-            </a:r>
-            <a:r>
-              <a:rPr lang="en-US" dirty="0" err="1">
-                <a:solidFill>
-                  <a:srgbClr val="0070C0"/>
-                </a:solidFill>
-                <a:latin typeface="Consolas" panose="020B0609020204030204" pitchFamily="49" charset="0"/>
-              </a:rPr>
-              <a:t>m.get</a:t>
-            </a:r>
-            <a:r>
-              <a:rPr lang="en-US" dirty="0">
-                <a:solidFill>
-                  <a:srgbClr val="0070C0"/>
-                </a:solidFill>
-                <a:latin typeface="Consolas" panose="020B0609020204030204" pitchFamily="49" charset="0"/>
-              </a:rPr>
-              <a:t>(k);</a:t>
+              <a:t>(0))</a:t>
             </a:r>
             <a:br>
               <a:rPr lang="en-US" dirty="0">
@@ -17234,7 +17136,7 @@
                 </a:solidFill>
                 <a:latin typeface="Consolas" panose="020B0609020204030204" pitchFamily="49" charset="0"/>
               </a:rPr>
-              <a:t>std::span&lt;U&gt; x = </a:t>
+              <a:t>           .</a:t>
             </a:r>
             <a:r>
               <a:rPr lang="en-US" dirty="0" err="1">
@@ -17243,7 +17145,7 @@
                 </a:solidFill>
                 <a:latin typeface="Consolas" panose="020B0609020204030204" pitchFamily="49" charset="0"/>
               </a:rPr>
-              <a:t>elem</a:t>
+              <a:t>value_or</a:t>
             </a:r>
             <a:r>
               <a:rPr lang="en-US" dirty="0">
@@ -17252,68 +17154,8 @@
                 </a:solidFill>
                 <a:latin typeface="Consolas" panose="020B0609020204030204" pitchFamily="49" charset="0"/>
               </a:rPr>
-              <a:t> ?</a:t>
-            </a:r>
-            <a:br>
-              <a:rPr lang="en-US" dirty="0">
-                <a:solidFill>
-                  <a:srgbClr val="0070C0"/>
-                </a:solidFill>
-                <a:latin typeface="Consolas" panose="020B0609020204030204" pitchFamily="49" charset="0"/>
-              </a:rPr>
-            </a:br>
-            <a:r>
-              <a:rPr lang="en-US" dirty="0">
-                <a:solidFill>
-                  <a:srgbClr val="0070C0"/>
-                </a:solidFill>
-                <a:latin typeface="Consolas" panose="020B0609020204030204" pitchFamily="49" charset="0"/>
-              </a:rPr>
-              <a:t> std::span&lt;U&gt;{*</a:t>
-            </a:r>
-            <a:r>
-              <a:rPr lang="en-US" dirty="0" err="1">
-                <a:solidFill>
-                  <a:srgbClr val="0070C0"/>
-                </a:solidFill>
-                <a:latin typeface="Consolas" panose="020B0609020204030204" pitchFamily="49" charset="0"/>
-              </a:rPr>
-              <a:t>elem</a:t>
-            </a:r>
-            <a:r>
-              <a:rPr lang="en-US" dirty="0">
-                <a:solidFill>
-                  <a:srgbClr val="0070C0"/>
-                </a:solidFill>
-                <a:latin typeface="Consolas" panose="020B0609020204030204" pitchFamily="49" charset="0"/>
-              </a:rPr>
-              <a:t>} :</a:t>
-            </a:r>
-            <a:br>
-              <a:rPr lang="en-US" dirty="0">
-                <a:solidFill>
-                  <a:srgbClr val="0070C0"/>
-                </a:solidFill>
-                <a:latin typeface="Consolas" panose="020B0609020204030204" pitchFamily="49" charset="0"/>
-              </a:rPr>
-            </a:br>
-            <a:r>
-              <a:rPr lang="en-US" dirty="0">
-                <a:solidFill>
-                  <a:srgbClr val="0070C0"/>
-                </a:solidFill>
-                <a:latin typeface="Consolas" panose="020B0609020204030204" pitchFamily="49" charset="0"/>
-              </a:rPr>
-              <a:t> std::span&lt;U&gt;{preset};</a:t>
-            </a:r>
-          </a:p>
-          <a:p>
-            <a:pPr marL="0" indent="0">
-              <a:buNone/>
-            </a:pPr>
-            <a:endParaRPr lang="en-US" dirty="0">
-              <a:latin typeface="Consolas" panose="020B0609020204030204" pitchFamily="49" charset="0"/>
-            </a:endParaRPr>
+              <a:t>(preset);</a:t>
+            </a:r>
           </a:p>
         </p:txBody>
       </p:sp>
@@ -17340,7 +17182,7 @@
           <a:p>
             <a:fld id="{508BABE2-3DC8-4D39-B4AF-CCF82C82E0F0}" type="datetime1">
               <a:rPr lang="en-US" smtClean="0"/>
-              <a:t>6/20/2025</a:t>
+              <a:t>6/22/2025</a:t>
             </a:fld>
             <a:endParaRPr lang="en-US"/>
           </a:p>

</xml_diff>